<commit_message>
Reflect most recent profile organization (#250)
* Replace references to "common" profile with references to "base" profile

* Replace references to microservices profile with references to application profile

* README files for all System View profiles

* Update examples to reflect profile names

* Remove obsolete file

* Add files via upload

* Add files via upload

* Remove obsolete file
</commit_message>
<xml_diff>
--- a/profiles/community/tosca/sources/figures.pptx
+++ b/profiles/community/tosca/sources/figures.pptx
@@ -214,7 +214,7 @@
           <a:p>
             <a:fld id="{9BC9C640-FDAB-4920-985D-AE6877D6D812}" type="datetimeFigureOut">
               <a:rPr lang="en-US" smtClean="0"/>
-              <a:t>11/14/2025</a:t>
+              <a:t>11/17/2025</a:t>
             </a:fld>
             <a:endParaRPr lang="en-US"/>
           </a:p>
@@ -628,7 +628,7 @@
           <a:p>
             <a:fld id="{7588158F-7D22-4D02-A7C1-554F35EEE72C}" type="datetimeFigureOut">
               <a:rPr lang="en-US" smtClean="0"/>
-              <a:t>11/14/2025</a:t>
+              <a:t>11/17/2025</a:t>
             </a:fld>
             <a:endParaRPr lang="en-US"/>
           </a:p>
@@ -826,7 +826,7 @@
           <a:p>
             <a:fld id="{7588158F-7D22-4D02-A7C1-554F35EEE72C}" type="datetimeFigureOut">
               <a:rPr lang="en-US" smtClean="0"/>
-              <a:t>11/14/2025</a:t>
+              <a:t>11/17/2025</a:t>
             </a:fld>
             <a:endParaRPr lang="en-US"/>
           </a:p>
@@ -1034,7 +1034,7 @@
           <a:p>
             <a:fld id="{7588158F-7D22-4D02-A7C1-554F35EEE72C}" type="datetimeFigureOut">
               <a:rPr lang="en-US" smtClean="0"/>
-              <a:t>11/14/2025</a:t>
+              <a:t>11/17/2025</a:t>
             </a:fld>
             <a:endParaRPr lang="en-US"/>
           </a:p>
@@ -1232,7 +1232,7 @@
           <a:p>
             <a:fld id="{7588158F-7D22-4D02-A7C1-554F35EEE72C}" type="datetimeFigureOut">
               <a:rPr lang="en-US" smtClean="0"/>
-              <a:t>11/14/2025</a:t>
+              <a:t>11/17/2025</a:t>
             </a:fld>
             <a:endParaRPr lang="en-US"/>
           </a:p>
@@ -1507,7 +1507,7 @@
           <a:p>
             <a:fld id="{7588158F-7D22-4D02-A7C1-554F35EEE72C}" type="datetimeFigureOut">
               <a:rPr lang="en-US" smtClean="0"/>
-              <a:t>11/14/2025</a:t>
+              <a:t>11/17/2025</a:t>
             </a:fld>
             <a:endParaRPr lang="en-US"/>
           </a:p>
@@ -1772,7 +1772,7 @@
           <a:p>
             <a:fld id="{7588158F-7D22-4D02-A7C1-554F35EEE72C}" type="datetimeFigureOut">
               <a:rPr lang="en-US" smtClean="0"/>
-              <a:t>11/14/2025</a:t>
+              <a:t>11/17/2025</a:t>
             </a:fld>
             <a:endParaRPr lang="en-US"/>
           </a:p>
@@ -2184,7 +2184,7 @@
           <a:p>
             <a:fld id="{7588158F-7D22-4D02-A7C1-554F35EEE72C}" type="datetimeFigureOut">
               <a:rPr lang="en-US" smtClean="0"/>
-              <a:t>11/14/2025</a:t>
+              <a:t>11/17/2025</a:t>
             </a:fld>
             <a:endParaRPr lang="en-US"/>
           </a:p>
@@ -2325,7 +2325,7 @@
           <a:p>
             <a:fld id="{7588158F-7D22-4D02-A7C1-554F35EEE72C}" type="datetimeFigureOut">
               <a:rPr lang="en-US" smtClean="0"/>
-              <a:t>11/14/2025</a:t>
+              <a:t>11/17/2025</a:t>
             </a:fld>
             <a:endParaRPr lang="en-US"/>
           </a:p>
@@ -2438,7 +2438,7 @@
           <a:p>
             <a:fld id="{7588158F-7D22-4D02-A7C1-554F35EEE72C}" type="datetimeFigureOut">
               <a:rPr lang="en-US" smtClean="0"/>
-              <a:t>11/14/2025</a:t>
+              <a:t>11/17/2025</a:t>
             </a:fld>
             <a:endParaRPr lang="en-US"/>
           </a:p>
@@ -2749,7 +2749,7 @@
           <a:p>
             <a:fld id="{7588158F-7D22-4D02-A7C1-554F35EEE72C}" type="datetimeFigureOut">
               <a:rPr lang="en-US" smtClean="0"/>
-              <a:t>11/14/2025</a:t>
+              <a:t>11/17/2025</a:t>
             </a:fld>
             <a:endParaRPr lang="en-US"/>
           </a:p>
@@ -3037,7 +3037,7 @@
           <a:p>
             <a:fld id="{7588158F-7D22-4D02-A7C1-554F35EEE72C}" type="datetimeFigureOut">
               <a:rPr lang="en-US" smtClean="0"/>
-              <a:t>11/14/2025</a:t>
+              <a:t>11/17/2025</a:t>
             </a:fld>
             <a:endParaRPr lang="en-US"/>
           </a:p>
@@ -3278,7 +3278,7 @@
           <a:p>
             <a:fld id="{7588158F-7D22-4D02-A7C1-554F35EEE72C}" type="datetimeFigureOut">
               <a:rPr lang="en-US" smtClean="0"/>
-              <a:t>11/14/2025</a:t>
+              <a:t>11/17/2025</a:t>
             </a:fld>
             <a:endParaRPr lang="en-US"/>
           </a:p>
@@ -4827,7 +4827,7 @@
                   </a:solidFill>
                   <a:latin typeface="Calibri" panose="020F0502020204030204"/>
                 </a:rPr>
-                <a:t>Common Profile</a:t>
+                <a:t>Base Profile</a:t>
               </a:r>
             </a:p>
           </p:txBody>
@@ -26180,7 +26180,7 @@
                 </a:solidFill>
                 <a:latin typeface="Calibri" panose="020F0502020204030204"/>
               </a:rPr>
-              <a:t>Common Profile</a:t>
+              <a:t>Base Profile</a:t>
             </a:r>
           </a:p>
         </p:txBody>
@@ -26319,7 +26319,7 @@
                   </a:solidFill>
                   <a:latin typeface="Calibri" panose="020F0502020204030204"/>
                 </a:rPr>
-                <a:t>Common Profile</a:t>
+                <a:t>Base Profile</a:t>
               </a:r>
             </a:p>
           </p:txBody>

</xml_diff>

<commit_message>
Reorganization, cleanup, bug fixes, and clarifications (#270)
* Minor reformatting

* Provider relationship derives from DependsOn

* All node types now derive from Base

* Add files via upload

* Add files via upload

* Document data profile

* Move kubernetes discussion into the Kubernetes profile README file
</commit_message>
<xml_diff>
--- a/profiles/community/tosca/sources/figures.pptx
+++ b/profiles/community/tosca/sources/figures.pptx
@@ -17,7 +17,7 @@
     <p:sldId id="263" r:id="rId8"/>
     <p:sldId id="268" r:id="rId9"/>
     <p:sldId id="261" r:id="rId10"/>
-    <p:sldId id="266" r:id="rId11"/>
+    <p:sldId id="293" r:id="rId11"/>
     <p:sldId id="285" r:id="rId12"/>
     <p:sldId id="288" r:id="rId13"/>
     <p:sldId id="289" r:id="rId14"/>
@@ -214,7 +214,7 @@
           <a:p>
             <a:fld id="{9BC9C640-FDAB-4920-985D-AE6877D6D812}" type="datetimeFigureOut">
               <a:rPr lang="en-US" smtClean="0"/>
-              <a:t>11/17/2025</a:t>
+              <a:t>1/2/2026</a:t>
             </a:fld>
             <a:endParaRPr lang="en-US"/>
           </a:p>
@@ -628,7 +628,7 @@
           <a:p>
             <a:fld id="{7588158F-7D22-4D02-A7C1-554F35EEE72C}" type="datetimeFigureOut">
               <a:rPr lang="en-US" smtClean="0"/>
-              <a:t>11/17/2025</a:t>
+              <a:t>1/2/2026</a:t>
             </a:fld>
             <a:endParaRPr lang="en-US"/>
           </a:p>
@@ -826,7 +826,7 @@
           <a:p>
             <a:fld id="{7588158F-7D22-4D02-A7C1-554F35EEE72C}" type="datetimeFigureOut">
               <a:rPr lang="en-US" smtClean="0"/>
-              <a:t>11/17/2025</a:t>
+              <a:t>1/2/2026</a:t>
             </a:fld>
             <a:endParaRPr lang="en-US"/>
           </a:p>
@@ -1034,7 +1034,7 @@
           <a:p>
             <a:fld id="{7588158F-7D22-4D02-A7C1-554F35EEE72C}" type="datetimeFigureOut">
               <a:rPr lang="en-US" smtClean="0"/>
-              <a:t>11/17/2025</a:t>
+              <a:t>1/2/2026</a:t>
             </a:fld>
             <a:endParaRPr lang="en-US"/>
           </a:p>
@@ -1232,7 +1232,7 @@
           <a:p>
             <a:fld id="{7588158F-7D22-4D02-A7C1-554F35EEE72C}" type="datetimeFigureOut">
               <a:rPr lang="en-US" smtClean="0"/>
-              <a:t>11/17/2025</a:t>
+              <a:t>1/2/2026</a:t>
             </a:fld>
             <a:endParaRPr lang="en-US"/>
           </a:p>
@@ -1507,7 +1507,7 @@
           <a:p>
             <a:fld id="{7588158F-7D22-4D02-A7C1-554F35EEE72C}" type="datetimeFigureOut">
               <a:rPr lang="en-US" smtClean="0"/>
-              <a:t>11/17/2025</a:t>
+              <a:t>1/2/2026</a:t>
             </a:fld>
             <a:endParaRPr lang="en-US"/>
           </a:p>
@@ -1772,7 +1772,7 @@
           <a:p>
             <a:fld id="{7588158F-7D22-4D02-A7C1-554F35EEE72C}" type="datetimeFigureOut">
               <a:rPr lang="en-US" smtClean="0"/>
-              <a:t>11/17/2025</a:t>
+              <a:t>1/2/2026</a:t>
             </a:fld>
             <a:endParaRPr lang="en-US"/>
           </a:p>
@@ -2184,7 +2184,7 @@
           <a:p>
             <a:fld id="{7588158F-7D22-4D02-A7C1-554F35EEE72C}" type="datetimeFigureOut">
               <a:rPr lang="en-US" smtClean="0"/>
-              <a:t>11/17/2025</a:t>
+              <a:t>1/2/2026</a:t>
             </a:fld>
             <a:endParaRPr lang="en-US"/>
           </a:p>
@@ -2325,7 +2325,7 @@
           <a:p>
             <a:fld id="{7588158F-7D22-4D02-A7C1-554F35EEE72C}" type="datetimeFigureOut">
               <a:rPr lang="en-US" smtClean="0"/>
-              <a:t>11/17/2025</a:t>
+              <a:t>1/2/2026</a:t>
             </a:fld>
             <a:endParaRPr lang="en-US"/>
           </a:p>
@@ -2438,7 +2438,7 @@
           <a:p>
             <a:fld id="{7588158F-7D22-4D02-A7C1-554F35EEE72C}" type="datetimeFigureOut">
               <a:rPr lang="en-US" smtClean="0"/>
-              <a:t>11/17/2025</a:t>
+              <a:t>1/2/2026</a:t>
             </a:fld>
             <a:endParaRPr lang="en-US"/>
           </a:p>
@@ -2749,7 +2749,7 @@
           <a:p>
             <a:fld id="{7588158F-7D22-4D02-A7C1-554F35EEE72C}" type="datetimeFigureOut">
               <a:rPr lang="en-US" smtClean="0"/>
-              <a:t>11/17/2025</a:t>
+              <a:t>1/2/2026</a:t>
             </a:fld>
             <a:endParaRPr lang="en-US"/>
           </a:p>
@@ -3037,7 +3037,7 @@
           <a:p>
             <a:fld id="{7588158F-7D22-4D02-A7C1-554F35EEE72C}" type="datetimeFigureOut">
               <a:rPr lang="en-US" smtClean="0"/>
-              <a:t>11/17/2025</a:t>
+              <a:t>1/2/2026</a:t>
             </a:fld>
             <a:endParaRPr lang="en-US"/>
           </a:p>
@@ -3278,7 +3278,7 @@
           <a:p>
             <a:fld id="{7588158F-7D22-4D02-A7C1-554F35EEE72C}" type="datetimeFigureOut">
               <a:rPr lang="en-US" smtClean="0"/>
-              <a:t>11/17/2025</a:t>
+              <a:t>1/2/2026</a:t>
             </a:fld>
             <a:endParaRPr lang="en-US"/>
           </a:p>
@@ -4502,14 +4502,13 @@
           </p:cNvPr>
           <p:cNvCxnSpPr>
             <a:cxnSpLocks/>
-            <a:stCxn id="4" idx="0"/>
           </p:cNvCxnSpPr>
           <p:nvPr/>
         </p:nvCxnSpPr>
         <p:spPr>
           <a:xfrm flipV="1">
-            <a:off x="5616756" y="3331998"/>
-            <a:ext cx="249415" cy="855502"/>
+            <a:off x="6350181" y="2973534"/>
+            <a:ext cx="906937" cy="1213486"/>
           </a:xfrm>
           <a:prstGeom prst="straightConnector1">
             <a:avLst/>
@@ -4536,13 +4535,14 @@
           </p:cNvPr>
           <p:cNvCxnSpPr>
             <a:cxnSpLocks/>
+            <a:stCxn id="5" idx="0"/>
           </p:cNvCxnSpPr>
           <p:nvPr/>
         </p:nvCxnSpPr>
         <p:spPr>
           <a:xfrm flipH="1" flipV="1">
-            <a:off x="6523693" y="3175582"/>
-            <a:ext cx="1425097" cy="995063"/>
+            <a:off x="7674395" y="2910911"/>
+            <a:ext cx="1465221" cy="1302080"/>
           </a:xfrm>
           <a:prstGeom prst="straightConnector1">
             <a:avLst/>
@@ -4569,15 +4569,14 @@
           </p:cNvPr>
           <p:cNvCxnSpPr>
             <a:cxnSpLocks/>
-            <a:stCxn id="6" idx="0"/>
             <a:endCxn id="3" idx="2"/>
           </p:cNvCxnSpPr>
           <p:nvPr/>
         </p:nvCxnSpPr>
         <p:spPr>
           <a:xfrm flipH="1" flipV="1">
-            <a:off x="6099551" y="3266867"/>
-            <a:ext cx="944249" cy="920633"/>
+            <a:off x="7433679" y="2971708"/>
+            <a:ext cx="343546" cy="1241283"/>
           </a:xfrm>
           <a:prstGeom prst="straightConnector1">
             <a:avLst/>
@@ -4609,8 +4608,8 @@
         </p:nvCxnSpPr>
         <p:spPr>
           <a:xfrm flipV="1">
-            <a:off x="3524587" y="1587033"/>
-            <a:ext cx="836251" cy="415005"/>
+            <a:off x="3524587" y="1605716"/>
+            <a:ext cx="957450" cy="691597"/>
           </a:xfrm>
           <a:prstGeom prst="straightConnector1">
             <a:avLst/>
@@ -4637,13 +4636,15 @@
           </p:cNvPr>
           <p:cNvCxnSpPr>
             <a:cxnSpLocks/>
+            <a:stCxn id="3" idx="1"/>
+            <a:endCxn id="11" idx="2"/>
           </p:cNvCxnSpPr>
           <p:nvPr/>
         </p:nvCxnSpPr>
         <p:spPr>
           <a:xfrm flipH="1" flipV="1">
-            <a:off x="5261987" y="1469624"/>
-            <a:ext cx="1044652" cy="1064829"/>
+            <a:off x="4773424" y="1579745"/>
+            <a:ext cx="2266640" cy="1075034"/>
           </a:xfrm>
           <a:prstGeom prst="straightConnector1">
             <a:avLst/>
@@ -4659,114 +4660,93 @@
           <a:effectLst/>
         </p:spPr>
       </p:cxnSp>
-      <p:grpSp>
-        <p:nvGrpSpPr>
-          <p:cNvPr id="25" name="Group 24">
+      <p:sp>
+        <p:nvSpPr>
+          <p:cNvPr id="11" name="Flowchart: Multidocument 10">
             <a:extLst>
               <a:ext uri="{FF2B5EF4-FFF2-40B4-BE49-F238E27FC236}">
-                <a16:creationId xmlns:a16="http://schemas.microsoft.com/office/drawing/2014/main" id="{2ED395F2-628A-524A-A355-693E0D05D893}"/>
+                <a16:creationId xmlns:a16="http://schemas.microsoft.com/office/drawing/2014/main" id="{04C52AB1-DB63-400E-0C51-63BC2EB5D291}"/>
               </a:ext>
             </a:extLst>
           </p:cNvPr>
-          <p:cNvGrpSpPr/>
+          <p:cNvSpPr/>
           <p:nvPr/>
-        </p:nvGrpSpPr>
-        <p:grpSpPr>
+        </p:nvSpPr>
+        <p:spPr>
           <a:xfrm>
-            <a:off x="4260934" y="623420"/>
-            <a:ext cx="1152150" cy="982296"/>
-            <a:chOff x="4171829" y="1725228"/>
-            <a:chExt cx="1152150" cy="982296"/>
+            <a:off x="4379809" y="919916"/>
+            <a:ext cx="914400" cy="685800"/>
           </a:xfrm>
-        </p:grpSpPr>
-        <p:sp>
-          <p:nvSpPr>
-            <p:cNvPr id="11" name="Flowchart: Multidocument 10">
-              <a:extLst>
-                <a:ext uri="{FF2B5EF4-FFF2-40B4-BE49-F238E27FC236}">
-                  <a16:creationId xmlns:a16="http://schemas.microsoft.com/office/drawing/2014/main" id="{04C52AB1-DB63-400E-0C51-63BC2EB5D291}"/>
-                </a:ext>
-              </a:extLst>
-            </p:cNvPr>
-            <p:cNvSpPr/>
-            <p:nvPr/>
-          </p:nvSpPr>
-          <p:spPr>
-            <a:xfrm>
-              <a:off x="4290704" y="2021724"/>
-              <a:ext cx="914400" cy="685800"/>
-            </a:xfrm>
-            <a:prstGeom prst="flowChartMultidocument">
-              <a:avLst/>
-            </a:prstGeom>
-            <a:noFill/>
-            <a:ln w="19050" cap="flat" cmpd="sng" algn="ctr">
-              <a:solidFill>
-                <a:sysClr val="windowText" lastClr="000000"/>
-              </a:solidFill>
-              <a:prstDash val="solid"/>
-            </a:ln>
-            <a:effectLst/>
-          </p:spPr>
-          <p:txBody>
-            <a:bodyPr tIns="91440" rtlCol="0" anchor="t" anchorCtr="0"/>
-            <a:lstStyle/>
-            <a:p>
-              <a:r>
-                <a:rPr lang="en-US" sz="1100" kern="0" dirty="0">
-                  <a:solidFill>
-                    <a:prstClr val="black"/>
-                  </a:solidFill>
-                  <a:latin typeface="Calibri" panose="020F0502020204030204"/>
-                </a:rPr>
-                <a:t>Core Profile</a:t>
-              </a:r>
-            </a:p>
-          </p:txBody>
-        </p:sp>
-        <p:sp>
-          <p:nvSpPr>
-            <p:cNvPr id="15" name="TextBox 14">
-              <a:extLst>
-                <a:ext uri="{FF2B5EF4-FFF2-40B4-BE49-F238E27FC236}">
-                  <a16:creationId xmlns:a16="http://schemas.microsoft.com/office/drawing/2014/main" id="{B69D0241-086D-AA8C-88E2-4FD64AD7E489}"/>
-                </a:ext>
-              </a:extLst>
-            </p:cNvPr>
-            <p:cNvSpPr txBox="1"/>
-            <p:nvPr/>
-          </p:nvSpPr>
-          <p:spPr>
-            <a:xfrm>
-              <a:off x="4171829" y="1725228"/>
-              <a:ext cx="1152150" cy="246221"/>
-            </a:xfrm>
-            <a:prstGeom prst="rect">
-              <a:avLst/>
-            </a:prstGeom>
-            <a:noFill/>
-          </p:spPr>
-          <p:txBody>
-            <a:bodyPr wrap="square" rtlCol="0">
-              <a:spAutoFit/>
-            </a:bodyPr>
-            <a:lstStyle>
-              <a:defPPr>
-                <a:defRPr lang="en-US"/>
-              </a:defPPr>
-              <a:lvl1pPr algn="ctr">
-                <a:defRPr sz="1000"/>
-              </a:lvl1pPr>
-            </a:lstStyle>
-            <a:p>
-              <a:r>
-                <a:rPr lang="en-US" dirty="0"/>
-                <a:t>Shared Definitions</a:t>
-              </a:r>
-            </a:p>
-          </p:txBody>
-        </p:sp>
-      </p:grpSp>
+          <a:prstGeom prst="flowChartMultidocument">
+            <a:avLst/>
+          </a:prstGeom>
+          <a:noFill/>
+          <a:ln w="19050" cap="flat" cmpd="sng" algn="ctr">
+            <a:solidFill>
+              <a:sysClr val="windowText" lastClr="000000"/>
+            </a:solidFill>
+            <a:prstDash val="solid"/>
+          </a:ln>
+          <a:effectLst/>
+        </p:spPr>
+        <p:txBody>
+          <a:bodyPr tIns="91440" rtlCol="0" anchor="t" anchorCtr="0"/>
+          <a:lstStyle/>
+          <a:p>
+            <a:r>
+              <a:rPr lang="en-US" sz="1100" kern="0" dirty="0">
+                <a:solidFill>
+                  <a:prstClr val="black"/>
+                </a:solidFill>
+                <a:latin typeface="Calibri" panose="020F0502020204030204"/>
+              </a:rPr>
+              <a:t>Core Profile</a:t>
+            </a:r>
+          </a:p>
+        </p:txBody>
+      </p:sp>
+      <p:sp>
+        <p:nvSpPr>
+          <p:cNvPr id="15" name="TextBox 14">
+            <a:extLst>
+              <a:ext uri="{FF2B5EF4-FFF2-40B4-BE49-F238E27FC236}">
+                <a16:creationId xmlns:a16="http://schemas.microsoft.com/office/drawing/2014/main" id="{B69D0241-086D-AA8C-88E2-4FD64AD7E489}"/>
+              </a:ext>
+            </a:extLst>
+          </p:cNvPr>
+          <p:cNvSpPr txBox="1"/>
+          <p:nvPr/>
+        </p:nvSpPr>
+        <p:spPr>
+          <a:xfrm>
+            <a:off x="4279222" y="666854"/>
+            <a:ext cx="1152150" cy="246221"/>
+          </a:xfrm>
+          <a:prstGeom prst="rect">
+            <a:avLst/>
+          </a:prstGeom>
+          <a:noFill/>
+        </p:spPr>
+        <p:txBody>
+          <a:bodyPr wrap="square" rtlCol="0">
+            <a:spAutoFit/>
+          </a:bodyPr>
+          <a:lstStyle>
+            <a:defPPr>
+              <a:defRPr lang="en-US"/>
+            </a:defPPr>
+            <a:lvl1pPr algn="ctr">
+              <a:defRPr sz="1000"/>
+            </a:lvl1pPr>
+          </a:lstStyle>
+          <a:p>
+            <a:r>
+              <a:rPr lang="en-US" dirty="0"/>
+              <a:t>Shared Definitions</a:t>
+            </a:r>
+          </a:p>
+        </p:txBody>
+      </p:sp>
       <p:grpSp>
         <p:nvGrpSpPr>
           <p:cNvPr id="36" name="Group 35">
@@ -4781,7 +4761,7 @@
         </p:nvGrpSpPr>
         <p:grpSpPr>
           <a:xfrm>
-            <a:off x="2567119" y="1580055"/>
+            <a:off x="2567119" y="1875330"/>
             <a:ext cx="914401" cy="1122349"/>
             <a:chOff x="2537811" y="1900092"/>
             <a:chExt cx="914401" cy="1122349"/>
@@ -4883,7 +4863,7 @@
         </p:nvSpPr>
         <p:spPr>
           <a:xfrm>
-            <a:off x="5705936" y="2607038"/>
+            <a:off x="7040064" y="2311879"/>
             <a:ext cx="914400" cy="685800"/>
           </a:xfrm>
           <a:prstGeom prst="flowChartMultidocument">
@@ -4939,7 +4919,7 @@
         </p:nvSpPr>
         <p:spPr>
           <a:xfrm>
-            <a:off x="6416459" y="3682285"/>
+            <a:off x="7503012" y="3737899"/>
             <a:ext cx="354263" cy="153888"/>
           </a:xfrm>
           <a:prstGeom prst="rect">
@@ -5008,76 +4988,7 @@
         </p:nvSpPr>
         <p:spPr>
           <a:xfrm>
-            <a:off x="5548480" y="3699346"/>
-            <a:ext cx="354263" cy="153888"/>
-          </a:xfrm>
-          <a:prstGeom prst="rect">
-            <a:avLst/>
-          </a:prstGeom>
-          <a:solidFill>
-            <a:sysClr val="window" lastClr="FFFFFF"/>
-          </a:solidFill>
-        </p:spPr>
-        <p:txBody>
-          <a:bodyPr wrap="none" lIns="0" tIns="0" rIns="0" bIns="0" rtlCol="0">
-            <a:spAutoFit/>
-          </a:bodyPr>
-          <a:lstStyle>
-            <a:defPPr>
-              <a:defRPr lang="en-US"/>
-            </a:defPPr>
-            <a:lvl1pPr marR="0" lvl="0" indent="0" algn="ctr" fontAlgn="auto">
-              <a:lnSpc>
-                <a:spcPct val="100000"/>
-              </a:lnSpc>
-              <a:spcBef>
-                <a:spcPts val="0"/>
-              </a:spcBef>
-              <a:spcAft>
-                <a:spcPts val="0"/>
-              </a:spcAft>
-              <a:buClrTx/>
-              <a:buSzTx/>
-              <a:buFontTx/>
-              <a:buNone/>
-              <a:tabLst/>
-              <a:defRPr kumimoji="0" sz="1000" b="0" i="0" u="none" strike="noStrike" kern="0" cap="none" spc="0" normalizeH="0" baseline="0">
-                <a:ln>
-                  <a:noFill/>
-                </a:ln>
-                <a:solidFill>
-                  <a:prstClr val="black"/>
-                </a:solidFill>
-                <a:effectLst/>
-                <a:uLnTx/>
-                <a:uFillTx/>
-                <a:latin typeface="Calibri" panose="020F0502020204030204"/>
-              </a:defRPr>
-            </a:lvl1pPr>
-          </a:lstStyle>
-          <a:p>
-            <a:r>
-              <a:rPr lang="en-US" dirty="0"/>
-              <a:t>import</a:t>
-            </a:r>
-          </a:p>
-        </p:txBody>
-      </p:sp>
-      <p:sp>
-        <p:nvSpPr>
-          <p:cNvPr id="20" name="TextBox 19">
-            <a:extLst>
-              <a:ext uri="{FF2B5EF4-FFF2-40B4-BE49-F238E27FC236}">
-                <a16:creationId xmlns:a16="http://schemas.microsoft.com/office/drawing/2014/main" id="{9C349EFD-2C17-393D-36F5-A04454845239}"/>
-              </a:ext>
-            </a:extLst>
-          </p:cNvPr>
-          <p:cNvSpPr txBox="1"/>
-          <p:nvPr/>
-        </p:nvSpPr>
-        <p:spPr>
-          <a:xfrm>
-            <a:off x="5574194" y="1900092"/>
+            <a:off x="6459988" y="3737899"/>
             <a:ext cx="354263" cy="153888"/>
           </a:xfrm>
           <a:prstGeom prst="rect">
@@ -5146,7 +5057,7 @@
         </p:nvSpPr>
         <p:spPr>
           <a:xfrm>
-            <a:off x="3686197" y="1753788"/>
+            <a:off x="3682966" y="2011787"/>
             <a:ext cx="354263" cy="153888"/>
           </a:xfrm>
           <a:prstGeom prst="rect">
@@ -5211,7 +5122,7 @@
         </p:nvGrpSpPr>
         <p:grpSpPr>
           <a:xfrm>
-            <a:off x="4904623" y="4187500"/>
+            <a:off x="5638048" y="4212991"/>
             <a:ext cx="1298452" cy="1088462"/>
             <a:chOff x="5157002" y="4582599"/>
             <a:chExt cx="1298452" cy="1088462"/>
@@ -5319,7 +5230,7 @@
         </p:nvGrpSpPr>
         <p:grpSpPr>
           <a:xfrm>
-            <a:off x="6331667" y="4187500"/>
+            <a:off x="7065092" y="4212991"/>
             <a:ext cx="1298452" cy="1102765"/>
             <a:chOff x="6801099" y="4582599"/>
             <a:chExt cx="1298452" cy="1102765"/>
@@ -5413,93 +5324,114 @@
           </p:txBody>
         </p:sp>
       </p:grpSp>
-      <p:sp>
-        <p:nvSpPr>
-          <p:cNvPr id="5" name="Flowchart: Multidocument 4">
+      <p:grpSp>
+        <p:nvGrpSpPr>
+          <p:cNvPr id="17" name="Gruppo 16">
             <a:extLst>
               <a:ext uri="{FF2B5EF4-FFF2-40B4-BE49-F238E27FC236}">
-                <a16:creationId xmlns:a16="http://schemas.microsoft.com/office/drawing/2014/main" id="{9ABF8E2D-4F30-107C-C91B-38A8217A03C3}"/>
+                <a16:creationId xmlns:a16="http://schemas.microsoft.com/office/drawing/2014/main" id="{6540609C-E29F-E878-A06B-A691E5B032B2}"/>
               </a:ext>
             </a:extLst>
           </p:cNvPr>
-          <p:cNvSpPr/>
+          <p:cNvGrpSpPr/>
           <p:nvPr/>
-        </p:nvSpPr>
-        <p:spPr>
+        </p:nvGrpSpPr>
+        <p:grpSpPr>
           <a:xfrm>
-            <a:off x="7886084" y="4187500"/>
-            <a:ext cx="914400" cy="685800"/>
+            <a:off x="8427483" y="4212991"/>
+            <a:ext cx="1298452" cy="1102765"/>
+            <a:chOff x="8427483" y="4187500"/>
+            <a:chExt cx="1298452" cy="1102765"/>
           </a:xfrm>
-          <a:prstGeom prst="flowChartMultidocument">
-            <a:avLst/>
-          </a:prstGeom>
-          <a:noFill/>
-          <a:ln w="19050" cap="flat" cmpd="sng" algn="ctr">
-            <a:solidFill>
-              <a:sysClr val="windowText" lastClr="000000"/>
-            </a:solidFill>
-            <a:prstDash val="solid"/>
-          </a:ln>
-          <a:effectLst/>
-        </p:spPr>
-        <p:txBody>
-          <a:bodyPr tIns="91440" rIns="0" rtlCol="0" anchor="t" anchorCtr="0"/>
-          <a:lstStyle/>
-          <a:p>
-            <a:r>
-              <a:rPr lang="en-US" sz="1100" kern="0" dirty="0">
-                <a:solidFill>
-                  <a:prstClr val="black"/>
-                </a:solidFill>
-                <a:latin typeface="Calibri" panose="020F0502020204030204"/>
-              </a:rPr>
-              <a:t>Proxmox Profile</a:t>
-            </a:r>
-          </a:p>
-        </p:txBody>
-      </p:sp>
-      <p:sp>
-        <p:nvSpPr>
-          <p:cNvPr id="24" name="TextBox 23">
-            <a:extLst>
-              <a:ext uri="{FF2B5EF4-FFF2-40B4-BE49-F238E27FC236}">
-                <a16:creationId xmlns:a16="http://schemas.microsoft.com/office/drawing/2014/main" id="{CB76762B-DE56-28B3-919B-D1AC20FD745B}"/>
-              </a:ext>
-            </a:extLst>
-          </p:cNvPr>
-          <p:cNvSpPr txBox="1"/>
-          <p:nvPr/>
-        </p:nvSpPr>
-        <p:spPr>
-          <a:xfrm>
-            <a:off x="7694058" y="4890155"/>
-            <a:ext cx="1298452" cy="400110"/>
-          </a:xfrm>
-          <a:prstGeom prst="rect">
-            <a:avLst/>
-          </a:prstGeom>
-          <a:noFill/>
-        </p:spPr>
-        <p:txBody>
-          <a:bodyPr wrap="square" rtlCol="0">
-            <a:spAutoFit/>
-          </a:bodyPr>
-          <a:lstStyle>
-            <a:defPPr>
-              <a:defRPr lang="en-US"/>
-            </a:defPPr>
-            <a:lvl1pPr algn="ctr">
-              <a:defRPr sz="1000"/>
-            </a:lvl1pPr>
-          </a:lstStyle>
-          <a:p>
-            <a:r>
-              <a:rPr lang="en-US" dirty="0"/>
-              <a:t>Vendor Specific  Definitions</a:t>
-            </a:r>
-          </a:p>
-        </p:txBody>
-      </p:sp>
+        </p:grpSpPr>
+        <p:sp>
+          <p:nvSpPr>
+            <p:cNvPr id="5" name="Flowchart: Multidocument 4">
+              <a:extLst>
+                <a:ext uri="{FF2B5EF4-FFF2-40B4-BE49-F238E27FC236}">
+                  <a16:creationId xmlns:a16="http://schemas.microsoft.com/office/drawing/2014/main" id="{9ABF8E2D-4F30-107C-C91B-38A8217A03C3}"/>
+                </a:ext>
+              </a:extLst>
+            </p:cNvPr>
+            <p:cNvSpPr/>
+            <p:nvPr/>
+          </p:nvSpPr>
+          <p:spPr>
+            <a:xfrm>
+              <a:off x="8619509" y="4187500"/>
+              <a:ext cx="914400" cy="685800"/>
+            </a:xfrm>
+            <a:prstGeom prst="flowChartMultidocument">
+              <a:avLst/>
+            </a:prstGeom>
+            <a:noFill/>
+            <a:ln w="19050" cap="flat" cmpd="sng" algn="ctr">
+              <a:solidFill>
+                <a:sysClr val="windowText" lastClr="000000"/>
+              </a:solidFill>
+              <a:prstDash val="solid"/>
+            </a:ln>
+            <a:effectLst/>
+          </p:spPr>
+          <p:txBody>
+            <a:bodyPr tIns="91440" rIns="0" rtlCol="0" anchor="t" anchorCtr="0"/>
+            <a:lstStyle/>
+            <a:p>
+              <a:r>
+                <a:rPr lang="en-US" sz="1100" kern="0" dirty="0">
+                  <a:solidFill>
+                    <a:prstClr val="black"/>
+                  </a:solidFill>
+                  <a:latin typeface="Calibri" panose="020F0502020204030204"/>
+                </a:rPr>
+                <a:t>Proxmox Profile</a:t>
+              </a:r>
+            </a:p>
+          </p:txBody>
+        </p:sp>
+        <p:sp>
+          <p:nvSpPr>
+            <p:cNvPr id="24" name="TextBox 23">
+              <a:extLst>
+                <a:ext uri="{FF2B5EF4-FFF2-40B4-BE49-F238E27FC236}">
+                  <a16:creationId xmlns:a16="http://schemas.microsoft.com/office/drawing/2014/main" id="{CB76762B-DE56-28B3-919B-D1AC20FD745B}"/>
+                </a:ext>
+              </a:extLst>
+            </p:cNvPr>
+            <p:cNvSpPr txBox="1"/>
+            <p:nvPr/>
+          </p:nvSpPr>
+          <p:spPr>
+            <a:xfrm>
+              <a:off x="8427483" y="4890155"/>
+              <a:ext cx="1298452" cy="400110"/>
+            </a:xfrm>
+            <a:prstGeom prst="rect">
+              <a:avLst/>
+            </a:prstGeom>
+            <a:noFill/>
+          </p:spPr>
+          <p:txBody>
+            <a:bodyPr wrap="square" rtlCol="0">
+              <a:spAutoFit/>
+            </a:bodyPr>
+            <a:lstStyle>
+              <a:defPPr>
+                <a:defRPr lang="en-US"/>
+              </a:defPPr>
+              <a:lvl1pPr algn="ctr">
+                <a:defRPr sz="1000"/>
+              </a:lvl1pPr>
+            </a:lstStyle>
+            <a:p>
+              <a:r>
+                <a:rPr lang="en-US" dirty="0"/>
+                <a:t>Vendor Specific  Definitions</a:t>
+              </a:r>
+            </a:p>
+          </p:txBody>
+        </p:sp>
+      </p:grpSp>
       <p:sp>
         <p:nvSpPr>
           <p:cNvPr id="42" name="TextBox 41">
@@ -5514,7 +5446,7 @@
         </p:nvSpPr>
         <p:spPr>
           <a:xfrm>
-            <a:off x="7142031" y="3682285"/>
+            <a:off x="8486569" y="3737899"/>
             <a:ext cx="354263" cy="153888"/>
           </a:xfrm>
           <a:prstGeom prst="rect">
@@ -5583,7 +5515,7 @@
         </p:nvSpPr>
         <p:spPr>
           <a:xfrm>
-            <a:off x="7223044" y="2670500"/>
+            <a:off x="8305103" y="2022915"/>
             <a:ext cx="914400" cy="685800"/>
           </a:xfrm>
           <a:prstGeom prst="flowChartMultidocument">
@@ -5630,8 +5562,8 @@
         </p:nvCxnSpPr>
         <p:spPr>
           <a:xfrm flipH="1" flipV="1">
-            <a:off x="5294209" y="1406910"/>
-            <a:ext cx="2024953" cy="1261038"/>
+            <a:off x="5042684" y="1514366"/>
+            <a:ext cx="3262419" cy="667822"/>
           </a:xfrm>
           <a:prstGeom prst="straightConnector1">
             <a:avLst/>
@@ -5649,75 +5581,6 @@
       </p:cxnSp>
       <p:sp>
         <p:nvSpPr>
-          <p:cNvPr id="43" name="TextBox 42">
-            <a:extLst>
-              <a:ext uri="{FF2B5EF4-FFF2-40B4-BE49-F238E27FC236}">
-                <a16:creationId xmlns:a16="http://schemas.microsoft.com/office/drawing/2014/main" id="{C92A4F98-22D6-686F-C297-ADE3A81BF790}"/>
-              </a:ext>
-            </a:extLst>
-          </p:cNvPr>
-          <p:cNvSpPr txBox="1"/>
-          <p:nvPr/>
-        </p:nvSpPr>
-        <p:spPr>
-          <a:xfrm>
-            <a:off x="6217412" y="2016604"/>
-            <a:ext cx="354263" cy="153888"/>
-          </a:xfrm>
-          <a:prstGeom prst="rect">
-            <a:avLst/>
-          </a:prstGeom>
-          <a:solidFill>
-            <a:sysClr val="window" lastClr="FFFFFF"/>
-          </a:solidFill>
-        </p:spPr>
-        <p:txBody>
-          <a:bodyPr wrap="none" lIns="0" tIns="0" rIns="0" bIns="0" rtlCol="0">
-            <a:spAutoFit/>
-          </a:bodyPr>
-          <a:lstStyle>
-            <a:defPPr>
-              <a:defRPr lang="en-US"/>
-            </a:defPPr>
-            <a:lvl1pPr marR="0" lvl="0" indent="0" algn="ctr" fontAlgn="auto">
-              <a:lnSpc>
-                <a:spcPct val="100000"/>
-              </a:lnSpc>
-              <a:spcBef>
-                <a:spcPts val="0"/>
-              </a:spcBef>
-              <a:spcAft>
-                <a:spcPts val="0"/>
-              </a:spcAft>
-              <a:buClrTx/>
-              <a:buSzTx/>
-              <a:buFontTx/>
-              <a:buNone/>
-              <a:tabLst/>
-              <a:defRPr kumimoji="0" sz="1000" b="0" i="0" u="none" strike="noStrike" kern="0" cap="none" spc="0" normalizeH="0" baseline="0">
-                <a:ln>
-                  <a:noFill/>
-                </a:ln>
-                <a:solidFill>
-                  <a:prstClr val="black"/>
-                </a:solidFill>
-                <a:effectLst/>
-                <a:uLnTx/>
-                <a:uFillTx/>
-                <a:latin typeface="Calibri" panose="020F0502020204030204"/>
-              </a:defRPr>
-            </a:lvl1pPr>
-          </a:lstStyle>
-          <a:p>
-            <a:r>
-              <a:rPr lang="en-US" dirty="0"/>
-              <a:t>import</a:t>
-            </a:r>
-          </a:p>
-        </p:txBody>
-      </p:sp>
-      <p:sp>
-        <p:nvSpPr>
           <p:cNvPr id="44" name="Flowchart: Multidocument 43">
             <a:extLst>
               <a:ext uri="{FF2B5EF4-FFF2-40B4-BE49-F238E27FC236}">
@@ -5730,7 +5593,7 @@
         </p:nvSpPr>
         <p:spPr>
           <a:xfrm>
-            <a:off x="762908" y="3298591"/>
+            <a:off x="762908" y="3593866"/>
             <a:ext cx="914400" cy="685800"/>
           </a:xfrm>
           <a:prstGeom prst="flowChartMultidocument">
@@ -5775,7 +5638,7 @@
         </p:nvSpPr>
         <p:spPr>
           <a:xfrm>
-            <a:off x="1838393" y="3298591"/>
+            <a:off x="1838393" y="3593866"/>
             <a:ext cx="914400" cy="685800"/>
           </a:xfrm>
           <a:prstGeom prst="flowChartMultidocument">
@@ -5831,7 +5694,7 @@
         </p:nvSpPr>
         <p:spPr>
           <a:xfrm>
-            <a:off x="2913878" y="3298591"/>
+            <a:off x="2913878" y="3593866"/>
             <a:ext cx="914400" cy="685800"/>
           </a:xfrm>
           <a:prstGeom prst="flowChartMultidocument">
@@ -5876,7 +5739,7 @@
         </p:nvSpPr>
         <p:spPr>
           <a:xfrm>
-            <a:off x="3989362" y="3298591"/>
+            <a:off x="3989362" y="3593866"/>
             <a:ext cx="914400" cy="685800"/>
           </a:xfrm>
           <a:prstGeom prst="flowChartMultidocument">
@@ -5934,7 +5797,7 @@
         </p:nvCxnSpPr>
         <p:spPr>
           <a:xfrm flipV="1">
-            <a:off x="1349283" y="2661356"/>
+            <a:off x="1349283" y="2956631"/>
             <a:ext cx="1170130" cy="597032"/>
           </a:xfrm>
           <a:prstGeom prst="straightConnector1">
@@ -5967,7 +5830,7 @@
         </p:nvCxnSpPr>
         <p:spPr>
           <a:xfrm flipH="1" flipV="1">
-            <a:off x="3343646" y="2615636"/>
+            <a:off x="3343646" y="2910911"/>
             <a:ext cx="1138391" cy="637235"/>
           </a:xfrm>
           <a:prstGeom prst="straightConnector1">
@@ -6000,7 +5863,7 @@
         </p:nvCxnSpPr>
         <p:spPr>
           <a:xfrm flipV="1">
-            <a:off x="2358500" y="2728173"/>
+            <a:off x="2358500" y="3023448"/>
             <a:ext cx="359177" cy="542986"/>
           </a:xfrm>
           <a:prstGeom prst="straightConnector1">
@@ -6033,7 +5896,7 @@
         </p:nvCxnSpPr>
         <p:spPr>
           <a:xfrm flipH="1" flipV="1">
-            <a:off x="3128700" y="2633924"/>
+            <a:off x="3128700" y="2929199"/>
             <a:ext cx="305285" cy="628091"/>
           </a:xfrm>
           <a:prstGeom prst="straightConnector1">
@@ -6052,10 +5915,10 @@
       </p:cxnSp>
       <p:sp>
         <p:nvSpPr>
-          <p:cNvPr id="31" name="Flowchart: Multidocument 30">
+          <p:cNvPr id="50" name="Rectangle: Rounded Corners 54">
             <a:extLst>
               <a:ext uri="{FF2B5EF4-FFF2-40B4-BE49-F238E27FC236}">
-                <a16:creationId xmlns:a16="http://schemas.microsoft.com/office/drawing/2014/main" id="{D725C170-C187-702F-44A5-7BCFDC47F195}"/>
+                <a16:creationId xmlns:a16="http://schemas.microsoft.com/office/drawing/2014/main" id="{76C890FC-2465-5532-13DE-0EE854EE73C3}"/>
               </a:ext>
             </a:extLst>
           </p:cNvPr>
@@ -6064,77 +5927,69 @@
         </p:nvSpPr>
         <p:spPr>
           <a:xfrm>
-            <a:off x="8274094" y="1942241"/>
-            <a:ext cx="914400" cy="685800"/>
+            <a:off x="493158" y="1875330"/>
+            <a:ext cx="4632245" cy="3040316"/>
           </a:xfrm>
-          <a:prstGeom prst="flowChartMultidocument">
+          <a:prstGeom prst="roundRect">
             <a:avLst/>
           </a:prstGeom>
           <a:noFill/>
-          <a:ln w="19050" cap="flat" cmpd="sng" algn="ctr">
-            <a:solidFill>
-              <a:sysClr val="windowText" lastClr="000000"/>
-            </a:solidFill>
-            <a:prstDash val="solid"/>
+          <a:ln w="19050">
+            <a:prstDash val="sysDash"/>
           </a:ln>
-          <a:effectLst/>
         </p:spPr>
+        <p:style>
+          <a:lnRef idx="2">
+            <a:schemeClr val="accent1">
+              <a:shade val="15000"/>
+            </a:schemeClr>
+          </a:lnRef>
+          <a:fillRef idx="1">
+            <a:schemeClr val="accent1"/>
+          </a:fillRef>
+          <a:effectRef idx="0">
+            <a:schemeClr val="accent1"/>
+          </a:effectRef>
+          <a:fontRef idx="minor">
+            <a:schemeClr val="lt1"/>
+          </a:fontRef>
+        </p:style>
         <p:txBody>
-          <a:bodyPr tIns="91440" rIns="0" rtlCol="0" anchor="t" anchorCtr="0"/>
+          <a:bodyPr rtlCol="0" anchor="t" anchorCtr="0"/>
           <a:lstStyle/>
           <a:p>
             <a:r>
-              <a:rPr lang="en-US" sz="1100" kern="0" dirty="0">
+              <a:rPr lang="en-US" sz="1100" b="1" dirty="0">
                 <a:solidFill>
-                  <a:prstClr val="black"/>
+                  <a:schemeClr val="tx1"/>
                 </a:solidFill>
-                <a:latin typeface="Calibri" panose="020F0502020204030204"/>
               </a:rPr>
-              <a:t>Docker Profile</a:t>
+              <a:t>System View Level</a:t>
+            </a:r>
+            <a:br>
+              <a:rPr lang="en-US" sz="1100" b="1" dirty="0">
+                <a:solidFill>
+                  <a:schemeClr val="tx1"/>
+                </a:solidFill>
+              </a:rPr>
+            </a:br>
+            <a:r>
+              <a:rPr lang="en-US" sz="1100" b="1" dirty="0">
+                <a:solidFill>
+                  <a:schemeClr val="tx1"/>
+                </a:solidFill>
+              </a:rPr>
+              <a:t>Profiles</a:t>
             </a:r>
           </a:p>
         </p:txBody>
       </p:sp>
-      <p:cxnSp>
-        <p:nvCxnSpPr>
-          <p:cNvPr id="32" name="Straight Arrow Connector 31">
+      <p:sp>
+        <p:nvSpPr>
+          <p:cNvPr id="20" name="TextBox 19">
             <a:extLst>
               <a:ext uri="{FF2B5EF4-FFF2-40B4-BE49-F238E27FC236}">
-                <a16:creationId xmlns:a16="http://schemas.microsoft.com/office/drawing/2014/main" id="{8FA49898-C06A-B131-11D1-CC7F3D2D8C3C}"/>
-              </a:ext>
-            </a:extLst>
-          </p:cNvPr>
-          <p:cNvCxnSpPr>
-            <a:cxnSpLocks/>
-            <a:stCxn id="31" idx="1"/>
-          </p:cNvCxnSpPr>
-          <p:nvPr/>
-        </p:nvCxnSpPr>
-        <p:spPr>
-          <a:xfrm flipH="1" flipV="1">
-            <a:off x="5326431" y="1353801"/>
-            <a:ext cx="2947663" cy="931340"/>
-          </a:xfrm>
-          <a:prstGeom prst="straightConnector1">
-            <a:avLst/>
-          </a:prstGeom>
-          <a:noFill/>
-          <a:ln w="12700" cap="flat" cmpd="sng" algn="ctr">
-            <a:solidFill>
-              <a:sysClr val="windowText" lastClr="000000"/>
-            </a:solidFill>
-            <a:prstDash val="solid"/>
-            <a:tailEnd type="triangle" w="lg" len="lg"/>
-          </a:ln>
-          <a:effectLst/>
-        </p:spPr>
-      </p:cxnSp>
-      <p:sp>
-        <p:nvSpPr>
-          <p:cNvPr id="37" name="TextBox 36">
-            <a:extLst>
-              <a:ext uri="{FF2B5EF4-FFF2-40B4-BE49-F238E27FC236}">
-                <a16:creationId xmlns:a16="http://schemas.microsoft.com/office/drawing/2014/main" id="{9960A4E3-0973-5BE6-E7C9-DFAED43F4BEA}"/>
+                <a16:creationId xmlns:a16="http://schemas.microsoft.com/office/drawing/2014/main" id="{9C349EFD-2C17-393D-36F5-A04454845239}"/>
               </a:ext>
             </a:extLst>
           </p:cNvPr>
@@ -6143,7 +5998,7 @@
         </p:nvSpPr>
         <p:spPr>
           <a:xfrm>
-            <a:off x="6996352" y="1900092"/>
+            <a:off x="5145569" y="1764899"/>
             <a:ext cx="354263" cy="153888"/>
           </a:xfrm>
           <a:prstGeom prst="rect">
@@ -6198,10 +6053,664 @@
           </a:p>
         </p:txBody>
       </p:sp>
+      <p:sp>
+        <p:nvSpPr>
+          <p:cNvPr id="59" name="Rectangle: Rounded Corners 54">
+            <a:extLst>
+              <a:ext uri="{FF2B5EF4-FFF2-40B4-BE49-F238E27FC236}">
+                <a16:creationId xmlns:a16="http://schemas.microsoft.com/office/drawing/2014/main" id="{D7661C0E-EB43-5260-695C-8D054A023988}"/>
+              </a:ext>
+            </a:extLst>
+          </p:cNvPr>
+          <p:cNvSpPr/>
+          <p:nvPr/>
+        </p:nvSpPr>
+        <p:spPr>
+          <a:xfrm>
+            <a:off x="6286500" y="1344168"/>
+            <a:ext cx="4404509" cy="2249698"/>
+          </a:xfrm>
+          <a:prstGeom prst="roundRect">
+            <a:avLst/>
+          </a:prstGeom>
+          <a:noFill/>
+          <a:ln w="19050">
+            <a:prstDash val="sysDash"/>
+          </a:ln>
+        </p:spPr>
+        <p:style>
+          <a:lnRef idx="2">
+            <a:schemeClr val="accent1">
+              <a:shade val="15000"/>
+            </a:schemeClr>
+          </a:lnRef>
+          <a:fillRef idx="1">
+            <a:schemeClr val="accent1"/>
+          </a:fillRef>
+          <a:effectRef idx="0">
+            <a:schemeClr val="accent1"/>
+          </a:effectRef>
+          <a:fontRef idx="minor">
+            <a:schemeClr val="lt1"/>
+          </a:fontRef>
+        </p:style>
+        <p:txBody>
+          <a:bodyPr rtlCol="0" anchor="b" anchorCtr="0"/>
+          <a:lstStyle/>
+          <a:p>
+            <a:pPr algn="r"/>
+            <a:r>
+              <a:rPr lang="en-US" sz="1100" b="1" dirty="0">
+                <a:solidFill>
+                  <a:schemeClr val="tx1"/>
+                </a:solidFill>
+              </a:rPr>
+              <a:t>Administrator View Level</a:t>
+            </a:r>
+            <a:br>
+              <a:rPr lang="en-US" sz="1100" b="1" dirty="0">
+                <a:solidFill>
+                  <a:schemeClr val="tx1"/>
+                </a:solidFill>
+              </a:rPr>
+            </a:br>
+            <a:r>
+              <a:rPr lang="en-US" sz="1100" b="1" dirty="0">
+                <a:solidFill>
+                  <a:schemeClr val="tx1"/>
+                </a:solidFill>
+              </a:rPr>
+              <a:t>Profiles</a:t>
+            </a:r>
+          </a:p>
+        </p:txBody>
+      </p:sp>
+      <p:sp>
+        <p:nvSpPr>
+          <p:cNvPr id="61" name="Rectangle: Rounded Corners 54">
+            <a:extLst>
+              <a:ext uri="{FF2B5EF4-FFF2-40B4-BE49-F238E27FC236}">
+                <a16:creationId xmlns:a16="http://schemas.microsoft.com/office/drawing/2014/main" id="{2249586F-831B-18B7-5673-35D79A83FE56}"/>
+              </a:ext>
+            </a:extLst>
+          </p:cNvPr>
+          <p:cNvSpPr/>
+          <p:nvPr/>
+        </p:nvSpPr>
+        <p:spPr>
+          <a:xfrm>
+            <a:off x="5695950" y="3995238"/>
+            <a:ext cx="5076825" cy="1302079"/>
+          </a:xfrm>
+          <a:prstGeom prst="roundRect">
+            <a:avLst/>
+          </a:prstGeom>
+          <a:noFill/>
+          <a:ln w="19050">
+            <a:prstDash val="sysDash"/>
+          </a:ln>
+        </p:spPr>
+        <p:style>
+          <a:lnRef idx="2">
+            <a:schemeClr val="accent1">
+              <a:shade val="15000"/>
+            </a:schemeClr>
+          </a:lnRef>
+          <a:fillRef idx="1">
+            <a:schemeClr val="accent1"/>
+          </a:fillRef>
+          <a:effectRef idx="0">
+            <a:schemeClr val="accent1"/>
+          </a:effectRef>
+          <a:fontRef idx="minor">
+            <a:schemeClr val="lt1"/>
+          </a:fontRef>
+        </p:style>
+        <p:txBody>
+          <a:bodyPr rtlCol="0" anchor="b" anchorCtr="0"/>
+          <a:lstStyle/>
+          <a:p>
+            <a:pPr algn="r"/>
+            <a:r>
+              <a:rPr lang="en-US" sz="1100" b="1" dirty="0">
+                <a:solidFill>
+                  <a:schemeClr val="tx1"/>
+                </a:solidFill>
+              </a:rPr>
+              <a:t>Device View Level</a:t>
+            </a:r>
+            <a:br>
+              <a:rPr lang="en-US" sz="1100" b="1" dirty="0">
+                <a:solidFill>
+                  <a:schemeClr val="tx1"/>
+                </a:solidFill>
+              </a:rPr>
+            </a:br>
+            <a:r>
+              <a:rPr lang="en-US" sz="1100" b="1" dirty="0">
+                <a:solidFill>
+                  <a:schemeClr val="tx1"/>
+                </a:solidFill>
+              </a:rPr>
+              <a:t>Profiles</a:t>
+            </a:r>
+          </a:p>
+        </p:txBody>
+      </p:sp>
+      <p:sp>
+        <p:nvSpPr>
+          <p:cNvPr id="62" name="TextBox 23">
+            <a:extLst>
+              <a:ext uri="{FF2B5EF4-FFF2-40B4-BE49-F238E27FC236}">
+                <a16:creationId xmlns:a16="http://schemas.microsoft.com/office/drawing/2014/main" id="{960406CB-FFA6-BF5F-5996-2EFE47892693}"/>
+              </a:ext>
+            </a:extLst>
+          </p:cNvPr>
+          <p:cNvSpPr txBox="1"/>
+          <p:nvPr/>
+        </p:nvSpPr>
+        <p:spPr>
+          <a:xfrm>
+            <a:off x="8113077" y="2717286"/>
+            <a:ext cx="1298452" cy="400110"/>
+          </a:xfrm>
+          <a:prstGeom prst="rect">
+            <a:avLst/>
+          </a:prstGeom>
+          <a:noFill/>
+        </p:spPr>
+        <p:txBody>
+          <a:bodyPr wrap="square" rtlCol="0">
+            <a:spAutoFit/>
+          </a:bodyPr>
+          <a:lstStyle>
+            <a:defPPr>
+              <a:defRPr lang="en-US"/>
+            </a:defPPr>
+            <a:lvl1pPr algn="ctr">
+              <a:defRPr sz="1000"/>
+            </a:lvl1pPr>
+          </a:lstStyle>
+          <a:p>
+            <a:r>
+              <a:rPr lang="en-US" dirty="0"/>
+              <a:t>Technology Specific  Definitions</a:t>
+            </a:r>
+          </a:p>
+        </p:txBody>
+      </p:sp>
+      <p:sp>
+        <p:nvSpPr>
+          <p:cNvPr id="63" name="TextBox 23">
+            <a:extLst>
+              <a:ext uri="{FF2B5EF4-FFF2-40B4-BE49-F238E27FC236}">
+                <a16:creationId xmlns:a16="http://schemas.microsoft.com/office/drawing/2014/main" id="{795E430A-F5E8-C881-D999-BA8581054B58}"/>
+              </a:ext>
+            </a:extLst>
+          </p:cNvPr>
+          <p:cNvSpPr txBox="1"/>
+          <p:nvPr/>
+        </p:nvSpPr>
+        <p:spPr>
+          <a:xfrm>
+            <a:off x="6846333" y="3110087"/>
+            <a:ext cx="1298452" cy="400110"/>
+          </a:xfrm>
+          <a:prstGeom prst="rect">
+            <a:avLst/>
+          </a:prstGeom>
+          <a:noFill/>
+        </p:spPr>
+        <p:txBody>
+          <a:bodyPr wrap="square" rtlCol="0">
+            <a:spAutoFit/>
+          </a:bodyPr>
+          <a:lstStyle>
+            <a:defPPr>
+              <a:defRPr lang="en-US"/>
+            </a:defPPr>
+            <a:lvl1pPr algn="ctr">
+              <a:defRPr sz="1000"/>
+            </a:lvl1pPr>
+          </a:lstStyle>
+          <a:p>
+            <a:r>
+              <a:rPr lang="en-US" dirty="0"/>
+              <a:t>Technology Specific  Definitions</a:t>
+            </a:r>
+          </a:p>
+        </p:txBody>
+      </p:sp>
+      <p:sp>
+        <p:nvSpPr>
+          <p:cNvPr id="64" name="TextBox 23">
+            <a:extLst>
+              <a:ext uri="{FF2B5EF4-FFF2-40B4-BE49-F238E27FC236}">
+                <a16:creationId xmlns:a16="http://schemas.microsoft.com/office/drawing/2014/main" id="{18179720-B443-5FEE-7FD2-E78B35927090}"/>
+              </a:ext>
+            </a:extLst>
+          </p:cNvPr>
+          <p:cNvSpPr txBox="1"/>
+          <p:nvPr/>
+        </p:nvSpPr>
+        <p:spPr>
+          <a:xfrm>
+            <a:off x="455058" y="4277471"/>
+            <a:ext cx="1298452" cy="553998"/>
+          </a:xfrm>
+          <a:prstGeom prst="rect">
+            <a:avLst/>
+          </a:prstGeom>
+          <a:noFill/>
+        </p:spPr>
+        <p:txBody>
+          <a:bodyPr wrap="square" rtlCol="0">
+            <a:spAutoFit/>
+          </a:bodyPr>
+          <a:lstStyle>
+            <a:defPPr>
+              <a:defRPr lang="en-US"/>
+            </a:defPPr>
+            <a:lvl1pPr algn="ctr">
+              <a:defRPr sz="1000"/>
+            </a:lvl1pPr>
+          </a:lstStyle>
+          <a:p>
+            <a:r>
+              <a:rPr lang="en-US" dirty="0"/>
+              <a:t>Technology &amp; Vendor Independent  Definitions</a:t>
+            </a:r>
+          </a:p>
+        </p:txBody>
+      </p:sp>
+      <p:sp>
+        <p:nvSpPr>
+          <p:cNvPr id="65" name="TextBox 23">
+            <a:extLst>
+              <a:ext uri="{FF2B5EF4-FFF2-40B4-BE49-F238E27FC236}">
+                <a16:creationId xmlns:a16="http://schemas.microsoft.com/office/drawing/2014/main" id="{8AF293E6-DC08-4A58-F0A3-82E0AB31961E}"/>
+              </a:ext>
+            </a:extLst>
+          </p:cNvPr>
+          <p:cNvSpPr txBox="1"/>
+          <p:nvPr/>
+        </p:nvSpPr>
+        <p:spPr>
+          <a:xfrm>
+            <a:off x="1569483" y="4277471"/>
+            <a:ext cx="1298452" cy="553998"/>
+          </a:xfrm>
+          <a:prstGeom prst="rect">
+            <a:avLst/>
+          </a:prstGeom>
+          <a:noFill/>
+        </p:spPr>
+        <p:txBody>
+          <a:bodyPr wrap="square" rtlCol="0">
+            <a:spAutoFit/>
+          </a:bodyPr>
+          <a:lstStyle>
+            <a:defPPr>
+              <a:defRPr lang="en-US"/>
+            </a:defPPr>
+            <a:lvl1pPr algn="ctr">
+              <a:defRPr sz="1000"/>
+            </a:lvl1pPr>
+          </a:lstStyle>
+          <a:p>
+            <a:r>
+              <a:rPr lang="en-US" dirty="0"/>
+              <a:t>Technology &amp; Vendor Independent  Definitions</a:t>
+            </a:r>
+          </a:p>
+        </p:txBody>
+      </p:sp>
+      <p:sp>
+        <p:nvSpPr>
+          <p:cNvPr id="66" name="TextBox 23">
+            <a:extLst>
+              <a:ext uri="{FF2B5EF4-FFF2-40B4-BE49-F238E27FC236}">
+                <a16:creationId xmlns:a16="http://schemas.microsoft.com/office/drawing/2014/main" id="{7069E369-A42E-1C94-3935-00DA297975CA}"/>
+              </a:ext>
+            </a:extLst>
+          </p:cNvPr>
+          <p:cNvSpPr txBox="1"/>
+          <p:nvPr/>
+        </p:nvSpPr>
+        <p:spPr>
+          <a:xfrm>
+            <a:off x="2683908" y="4277471"/>
+            <a:ext cx="1298452" cy="553998"/>
+          </a:xfrm>
+          <a:prstGeom prst="rect">
+            <a:avLst/>
+          </a:prstGeom>
+          <a:noFill/>
+        </p:spPr>
+        <p:txBody>
+          <a:bodyPr wrap="square" rtlCol="0">
+            <a:spAutoFit/>
+          </a:bodyPr>
+          <a:lstStyle>
+            <a:defPPr>
+              <a:defRPr lang="en-US"/>
+            </a:defPPr>
+            <a:lvl1pPr algn="ctr">
+              <a:defRPr sz="1000"/>
+            </a:lvl1pPr>
+          </a:lstStyle>
+          <a:p>
+            <a:r>
+              <a:rPr lang="en-US" dirty="0"/>
+              <a:t>Technology &amp; Vendor Independent  Definitions</a:t>
+            </a:r>
+          </a:p>
+        </p:txBody>
+      </p:sp>
+      <p:sp>
+        <p:nvSpPr>
+          <p:cNvPr id="67" name="TextBox 23">
+            <a:extLst>
+              <a:ext uri="{FF2B5EF4-FFF2-40B4-BE49-F238E27FC236}">
+                <a16:creationId xmlns:a16="http://schemas.microsoft.com/office/drawing/2014/main" id="{F6199324-8B3E-7961-C6A6-B9E034D75DEB}"/>
+              </a:ext>
+            </a:extLst>
+          </p:cNvPr>
+          <p:cNvSpPr txBox="1"/>
+          <p:nvPr/>
+        </p:nvSpPr>
+        <p:spPr>
+          <a:xfrm>
+            <a:off x="3836433" y="4277471"/>
+            <a:ext cx="1298452" cy="553998"/>
+          </a:xfrm>
+          <a:prstGeom prst="rect">
+            <a:avLst/>
+          </a:prstGeom>
+          <a:noFill/>
+        </p:spPr>
+        <p:txBody>
+          <a:bodyPr wrap="square" rtlCol="0">
+            <a:spAutoFit/>
+          </a:bodyPr>
+          <a:lstStyle>
+            <a:defPPr>
+              <a:defRPr lang="en-US"/>
+            </a:defPPr>
+            <a:lvl1pPr algn="ctr">
+              <a:defRPr sz="1000"/>
+            </a:lvl1pPr>
+          </a:lstStyle>
+          <a:p>
+            <a:r>
+              <a:rPr lang="en-US" dirty="0"/>
+              <a:t>Technology &amp; Vendor Independent  Definitions</a:t>
+            </a:r>
+          </a:p>
+        </p:txBody>
+      </p:sp>
+      <p:sp>
+        <p:nvSpPr>
+          <p:cNvPr id="12" name="Flowchart: Multidocument 11">
+            <a:extLst>
+              <a:ext uri="{FF2B5EF4-FFF2-40B4-BE49-F238E27FC236}">
+                <a16:creationId xmlns:a16="http://schemas.microsoft.com/office/drawing/2014/main" id="{E1795511-46C0-59E4-3088-3386789C903C}"/>
+              </a:ext>
+            </a:extLst>
+          </p:cNvPr>
+          <p:cNvSpPr/>
+          <p:nvPr/>
+        </p:nvSpPr>
+        <p:spPr>
+          <a:xfrm>
+            <a:off x="9465580" y="1582029"/>
+            <a:ext cx="914400" cy="685800"/>
+          </a:xfrm>
+          <a:prstGeom prst="flowChartMultidocument">
+            <a:avLst/>
+          </a:prstGeom>
+          <a:noFill/>
+          <a:ln w="19050" cap="flat" cmpd="sng" algn="ctr">
+            <a:solidFill>
+              <a:sysClr val="windowText" lastClr="000000"/>
+            </a:solidFill>
+            <a:prstDash val="solid"/>
+          </a:ln>
+          <a:effectLst/>
+        </p:spPr>
+        <p:txBody>
+          <a:bodyPr tIns="91440" rIns="0" rtlCol="0" anchor="t" anchorCtr="0"/>
+          <a:lstStyle/>
+          <a:p>
+            <a:r>
+              <a:rPr lang="en-US" sz="1100" kern="0" dirty="0">
+                <a:solidFill>
+                  <a:prstClr val="black"/>
+                </a:solidFill>
+                <a:latin typeface="Calibri" panose="020F0502020204030204"/>
+              </a:rPr>
+              <a:t>Docker Profile</a:t>
+            </a:r>
+          </a:p>
+        </p:txBody>
+      </p:sp>
+      <p:cxnSp>
+        <p:nvCxnSpPr>
+          <p:cNvPr id="26" name="Straight Arrow Connector 25">
+            <a:extLst>
+              <a:ext uri="{FF2B5EF4-FFF2-40B4-BE49-F238E27FC236}">
+                <a16:creationId xmlns:a16="http://schemas.microsoft.com/office/drawing/2014/main" id="{748E1544-6F30-0BA2-F81C-200A64832AE6}"/>
+              </a:ext>
+            </a:extLst>
+          </p:cNvPr>
+          <p:cNvCxnSpPr>
+            <a:cxnSpLocks/>
+          </p:cNvCxnSpPr>
+          <p:nvPr/>
+        </p:nvCxnSpPr>
+        <p:spPr>
+          <a:xfrm flipH="1" flipV="1">
+            <a:off x="5326431" y="1353801"/>
+            <a:ext cx="4085098" cy="411098"/>
+          </a:xfrm>
+          <a:prstGeom prst="straightConnector1">
+            <a:avLst/>
+          </a:prstGeom>
+          <a:noFill/>
+          <a:ln w="12700" cap="flat" cmpd="sng" algn="ctr">
+            <a:solidFill>
+              <a:sysClr val="windowText" lastClr="000000"/>
+            </a:solidFill>
+            <a:prstDash val="solid"/>
+            <a:tailEnd type="triangle" w="lg" len="lg"/>
+          </a:ln>
+          <a:effectLst/>
+        </p:spPr>
+      </p:cxnSp>
+      <p:sp>
+        <p:nvSpPr>
+          <p:cNvPr id="27" name="TextBox 26">
+            <a:extLst>
+              <a:ext uri="{FF2B5EF4-FFF2-40B4-BE49-F238E27FC236}">
+                <a16:creationId xmlns:a16="http://schemas.microsoft.com/office/drawing/2014/main" id="{EBA97C30-3B6B-32C7-9BFD-A18536455F8E}"/>
+              </a:ext>
+            </a:extLst>
+          </p:cNvPr>
+          <p:cNvSpPr txBox="1"/>
+          <p:nvPr/>
+        </p:nvSpPr>
+        <p:spPr>
+          <a:xfrm>
+            <a:off x="6996352" y="1900092"/>
+            <a:ext cx="354263" cy="153888"/>
+          </a:xfrm>
+          <a:prstGeom prst="rect">
+            <a:avLst/>
+          </a:prstGeom>
+          <a:solidFill>
+            <a:sysClr val="window" lastClr="FFFFFF"/>
+          </a:solidFill>
+        </p:spPr>
+        <p:txBody>
+          <a:bodyPr wrap="square" lIns="0" tIns="0" rIns="0" bIns="0" rtlCol="0">
+            <a:spAutoFit/>
+          </a:bodyPr>
+          <a:lstStyle>
+            <a:defPPr>
+              <a:defRPr lang="en-US"/>
+            </a:defPPr>
+            <a:lvl1pPr marR="0" lvl="0" indent="0" algn="ctr" fontAlgn="auto">
+              <a:lnSpc>
+                <a:spcPct val="100000"/>
+              </a:lnSpc>
+              <a:spcBef>
+                <a:spcPts val="0"/>
+              </a:spcBef>
+              <a:spcAft>
+                <a:spcPts val="0"/>
+              </a:spcAft>
+              <a:buClrTx/>
+              <a:buSzTx/>
+              <a:buFontTx/>
+              <a:buNone/>
+              <a:tabLst/>
+              <a:defRPr kumimoji="0" sz="1000" b="0" i="0" u="none" strike="noStrike" kern="0" cap="none" spc="0" normalizeH="0" baseline="0">
+                <a:ln>
+                  <a:noFill/>
+                </a:ln>
+                <a:solidFill>
+                  <a:prstClr val="black"/>
+                </a:solidFill>
+                <a:effectLst/>
+                <a:uLnTx/>
+                <a:uFillTx/>
+                <a:latin typeface="Calibri" panose="020F0502020204030204"/>
+              </a:defRPr>
+            </a:lvl1pPr>
+          </a:lstStyle>
+          <a:p>
+            <a:r>
+              <a:rPr lang="en-US" dirty="0"/>
+              <a:t>import</a:t>
+            </a:r>
+          </a:p>
+        </p:txBody>
+      </p:sp>
+      <p:sp>
+        <p:nvSpPr>
+          <p:cNvPr id="43" name="TextBox 42">
+            <a:extLst>
+              <a:ext uri="{FF2B5EF4-FFF2-40B4-BE49-F238E27FC236}">
+                <a16:creationId xmlns:a16="http://schemas.microsoft.com/office/drawing/2014/main" id="{C92A4F98-22D6-686F-C297-ADE3A81BF790}"/>
+              </a:ext>
+            </a:extLst>
+          </p:cNvPr>
+          <p:cNvSpPr txBox="1"/>
+          <p:nvPr/>
+        </p:nvSpPr>
+        <p:spPr>
+          <a:xfrm>
+            <a:off x="7100283" y="1459697"/>
+            <a:ext cx="354263" cy="153888"/>
+          </a:xfrm>
+          <a:prstGeom prst="rect">
+            <a:avLst/>
+          </a:prstGeom>
+          <a:solidFill>
+            <a:sysClr val="window" lastClr="FFFFFF"/>
+          </a:solidFill>
+        </p:spPr>
+        <p:txBody>
+          <a:bodyPr wrap="none" lIns="0" tIns="0" rIns="0" bIns="0" rtlCol="0">
+            <a:spAutoFit/>
+          </a:bodyPr>
+          <a:lstStyle>
+            <a:defPPr>
+              <a:defRPr lang="en-US"/>
+            </a:defPPr>
+            <a:lvl1pPr marR="0" lvl="0" indent="0" algn="ctr" fontAlgn="auto">
+              <a:lnSpc>
+                <a:spcPct val="100000"/>
+              </a:lnSpc>
+              <a:spcBef>
+                <a:spcPts val="0"/>
+              </a:spcBef>
+              <a:spcAft>
+                <a:spcPts val="0"/>
+              </a:spcAft>
+              <a:buClrTx/>
+              <a:buSzTx/>
+              <a:buFontTx/>
+              <a:buNone/>
+              <a:tabLst/>
+              <a:defRPr kumimoji="0" sz="1000" b="0" i="0" u="none" strike="noStrike" kern="0" cap="none" spc="0" normalizeH="0" baseline="0">
+                <a:ln>
+                  <a:noFill/>
+                </a:ln>
+                <a:solidFill>
+                  <a:prstClr val="black"/>
+                </a:solidFill>
+                <a:effectLst/>
+                <a:uLnTx/>
+                <a:uFillTx/>
+                <a:latin typeface="Calibri" panose="020F0502020204030204"/>
+              </a:defRPr>
+            </a:lvl1pPr>
+          </a:lstStyle>
+          <a:p>
+            <a:r>
+              <a:rPr lang="en-US" dirty="0"/>
+              <a:t>import</a:t>
+            </a:r>
+          </a:p>
+        </p:txBody>
+      </p:sp>
+      <p:sp>
+        <p:nvSpPr>
+          <p:cNvPr id="31" name="TextBox 23">
+            <a:extLst>
+              <a:ext uri="{FF2B5EF4-FFF2-40B4-BE49-F238E27FC236}">
+                <a16:creationId xmlns:a16="http://schemas.microsoft.com/office/drawing/2014/main" id="{F88E5555-89F3-D3F6-18D5-EC8E7B833A97}"/>
+              </a:ext>
+            </a:extLst>
+          </p:cNvPr>
+          <p:cNvSpPr txBox="1"/>
+          <p:nvPr/>
+        </p:nvSpPr>
+        <p:spPr>
+          <a:xfrm>
+            <a:off x="9258061" y="2264175"/>
+            <a:ext cx="1298452" cy="400110"/>
+          </a:xfrm>
+          <a:prstGeom prst="rect">
+            <a:avLst/>
+          </a:prstGeom>
+          <a:noFill/>
+        </p:spPr>
+        <p:txBody>
+          <a:bodyPr wrap="square" rtlCol="0">
+            <a:spAutoFit/>
+          </a:bodyPr>
+          <a:lstStyle>
+            <a:defPPr>
+              <a:defRPr lang="en-US"/>
+            </a:defPPr>
+            <a:lvl1pPr algn="ctr">
+              <a:defRPr sz="1000"/>
+            </a:lvl1pPr>
+          </a:lstStyle>
+          <a:p>
+            <a:r>
+              <a:rPr lang="en-US" dirty="0"/>
+              <a:t>Technology Specific  Definitions</a:t>
+            </a:r>
+          </a:p>
+        </p:txBody>
+      </p:sp>
     </p:spTree>
     <p:extLst>
       <p:ext uri="{BB962C8B-B14F-4D97-AF65-F5344CB8AC3E}">
-        <p14:creationId xmlns:p14="http://schemas.microsoft.com/office/powerpoint/2010/main" val="3174812243"/>
+        <p14:creationId xmlns:p14="http://schemas.microsoft.com/office/powerpoint/2010/main" val="4288563986"/>
       </p:ext>
     </p:extLst>
   </p:cSld>

</xml_diff>